<commit_message>
feat: Enhance backend and frontend functionality
- Backend:
  - Introduced `clearFileCache` to refresh file data after uploads.
  - Updated `PPT_LIBRARY_PATH` to use `process.cwd()` for correct path resolution in Docker.
  - Improved song retrieval logic to handle pagination and search more effectively.
  - Added logging for directory creation in `PPT_LIBRARY_PATH`.

- Docker:
  - Modified `docker-compose.yml` to build images locally instead of pulling from Docker Hub.
  - Ensured proper volume mounts for resource synchronization.

- Frontend:
  - Redesigned layout to support responsive navigation with a Drawer component.
  - Implemented mobile-friendly tab navigation for song search and selection.
  - Enhanced user experience with improved loading states and error handling in the file generator.
  - Updated styling for better visual consistency across devices.

- Updated PPT file in output directory.
</commit_message>
<xml_diff>
--- a/output/敬拜PPT.pptx
+++ b/output/敬拜PPT.pptx
@@ -8,31 +8,8 @@
     <p:sldId id="256" r:id="rId7"/>
     <p:sldId id="257" r:id="rId8"/>
     <p:sldId id="258" r:id="rId9"/>
-    <p:sldId id="259" r:id="rId10"/>
-    <p:sldId id="260" r:id="rId11"/>
-    <p:sldId id="261" r:id="rId12"/>
-    <p:sldId id="262" r:id="rId13"/>
-    <p:sldId id="263" r:id="rId14"/>
-    <p:sldId id="264" r:id="rId15"/>
-    <p:sldId id="265" r:id="rId16"/>
-    <p:sldId id="266" r:id="rId17"/>
-    <p:sldId id="267" r:id="rId18"/>
-    <p:sldId id="268" r:id="rId19"/>
-    <p:sldId id="269" r:id="rId20"/>
-    <p:sldId id="270" r:id="rId21"/>
-    <p:sldId id="271" r:id="rId22"/>
-    <p:sldId id="272" r:id="rId23"/>
-    <p:sldId id="273" r:id="rId24"/>
-    <p:sldId id="274" r:id="rId25"/>
-    <p:sldId id="275" r:id="rId26"/>
-    <p:sldId id="276" r:id="rId27"/>
-    <p:sldId id="277" r:id="rId28"/>
-    <p:sldId id="278" r:id="rId29"/>
-    <p:sldId id="279" r:id="rId30"/>
-    <p:sldId id="280" r:id="rId31"/>
-    <p:sldId id="281" r:id="rId32"/>
   </p:sldIdLst>
-  <p:sldSz cx="14630400" cy="8229600" type="screen4x3"/>
+  <p:sldSz cx="9144000" cy="5143500" type="screen4x3"/>
   <p:notesSz cx="6858000" cy="9144000"/>
   <p:defaultTextStyle>
     <a:defPPr>
@@ -3129,8 +3106,8 @@
         </p:nvSpPr>
         <p:spPr>
           <a:xfrm>
-            <a:off x="914400" y="91440"/>
-            <a:ext cx="12801600" cy="6858000"/>
+            <a:off x="457200" y="91440"/>
+            <a:ext cx="8229600" cy="2286000"/>
           </a:xfrm>
           <a:prstGeom prst="rect">
             <a:avLst/>
@@ -3138,34 +3115,30 @@
           <a:noFill/>
         </p:spPr>
         <p:txBody>
-          <a:bodyPr wrap="square" anchor="t">
+          <a:bodyPr wrap="none">
             <a:spAutoFit/>
           </a:bodyPr>
           <a:lstStyle/>
           <a:p>
-            <a:pPr algn="ctr">
-              <a:defRPr sz="4400" b="1">
+            <a:pPr algn="ctr"/>
+            <a:r>
+              <a:rPr sz="3200" b="1">
                 <a:solidFill>
                   <a:srgbClr val="FFFF00"/>
                 </a:solidFill>
                 <a:latin typeface="微軟正黑體"/>
-              </a:defRPr>
-            </a:pPr>
-            <a:r>
-              <a:t>1.願天歡喜 願地快樂</a:t>
-            </a:r>
-          </a:p>
-          <a:p>
-            <a:pPr algn="ctr">
-              <a:defRPr sz="4400" b="1">
+              </a:rPr>
+              <a:t>從天父而來的愛和恩典 把我們冰冷的心溶解</a:t>
+            </a:r>
+            <a:br/>
+            <a:r>
+              <a:rPr sz="3200" b="1">
                 <a:solidFill>
                   <a:srgbClr val="FFFF00"/>
                 </a:solidFill>
                 <a:latin typeface="微軟正黑體"/>
-              </a:defRPr>
-            </a:pPr>
-            <a:r>
-              <a:t>願海和其中充滿的澎湃</a:t>
+              </a:rPr>
+              <a:t>讓我們獻出每個音符 把它化為讚美之泉</a:t>
             </a:r>
           </a:p>
         </p:txBody>
@@ -3178,8 +3151,8 @@
         </p:nvSpPr>
         <p:spPr>
           <a:xfrm>
-            <a:off x="914400" y="7543800"/>
-            <a:ext cx="12801600" cy="685800"/>
+            <a:off x="457200" y="4663440"/>
+            <a:ext cx="8229600" cy="457200"/>
           </a:xfrm>
           <a:prstGeom prst="rect">
             <a:avLst/>
@@ -3192,1126 +3165,15 @@
           </a:bodyPr>
           <a:lstStyle/>
           <a:p>
-            <a:pPr algn="ctr">
-              <a:defRPr sz="2400">
+            <a:pPr algn="ctr"/>
+            <a:r>
+              <a:rPr sz="2000" b="0">
                 <a:solidFill>
                   <a:srgbClr val="FFFF00"/>
                 </a:solidFill>
                 <a:latin typeface="微軟正黑體"/>
-              </a:defRPr>
-            </a:pPr>
-            <a:r>
-              <a:t>來歡呼來讚美</a:t>
-            </a:r>
-          </a:p>
-        </p:txBody>
-      </p:sp>
-    </p:spTree>
-  </p:cSld>
-  <p:clrMapOvr>
-    <a:masterClrMapping/>
-  </p:clrMapOvr>
-</p:sld>
-</file>
-
-<file path=ppt/slides/slide10.xml><?xml version="1.0" encoding="utf-8"?>
-<p:sld xmlns:a="http://schemas.openxmlformats.org/drawingml/2006/main" xmlns:p="http://schemas.openxmlformats.org/presentationml/2006/main" xmlns:r="http://schemas.openxmlformats.org/officeDocument/2006/relationships">
-  <p:cSld>
-    <p:bg>
-      <p:bgPr>
-        <a:solidFill>
-          <a:srgbClr val="000000"/>
-        </a:solidFill>
-        <a:effectLst/>
-      </p:bgPr>
-    </p:bg>
-    <p:spTree>
-      <p:nvGrpSpPr>
-        <p:cNvPr id="1" name=""/>
-        <p:cNvGrpSpPr/>
-        <p:nvPr/>
-      </p:nvGrpSpPr>
-      <p:grpSpPr/>
-      <p:sp>
-        <p:nvSpPr>
-          <p:cNvPr id="2" name="TextBox 1"/>
-          <p:cNvSpPr txBox="1"/>
-          <p:nvPr/>
-        </p:nvSpPr>
-        <p:spPr>
-          <a:xfrm>
-            <a:off x="914400" y="91440"/>
-            <a:ext cx="12801600" cy="6858000"/>
-          </a:xfrm>
-          <a:prstGeom prst="rect">
-            <a:avLst/>
-          </a:prstGeom>
-          <a:noFill/>
-        </p:spPr>
-        <p:txBody>
-          <a:bodyPr wrap="square" anchor="t">
-            <a:spAutoFit/>
-          </a:bodyPr>
-          <a:lstStyle/>
-          <a:p>
-            <a:pPr algn="ctr">
-              <a:defRPr sz="4400" b="1">
-                <a:solidFill>
-                  <a:srgbClr val="FFFF00"/>
-                </a:solidFill>
-                <a:latin typeface="微軟正黑體"/>
-              </a:defRPr>
-            </a:pPr>
-            <a:r>
-              <a:t>※天上地下 合一敬拜</a:t>
-            </a:r>
-          </a:p>
-          <a:p>
-            <a:pPr algn="ctr">
-              <a:defRPr sz="4400" b="1">
-                <a:solidFill>
-                  <a:srgbClr val="FFFF00"/>
-                </a:solidFill>
-                <a:latin typeface="微軟正黑體"/>
-              </a:defRPr>
-            </a:pPr>
-            <a:r>
-              <a:t>歡呼耶穌基督 聖潔羔羊 榮耀歸於祢</a:t>
-            </a:r>
-          </a:p>
-        </p:txBody>
-      </p:sp>
-      <p:sp>
-        <p:nvSpPr>
-          <p:cNvPr id="3" name="TextBox 2"/>
-          <p:cNvSpPr txBox="1"/>
-          <p:nvPr/>
-        </p:nvSpPr>
-        <p:spPr>
-          <a:xfrm>
-            <a:off x="914400" y="7543800"/>
-            <a:ext cx="12801600" cy="685800"/>
-          </a:xfrm>
-          <a:prstGeom prst="rect">
-            <a:avLst/>
-          </a:prstGeom>
-          <a:noFill/>
-        </p:spPr>
-        <p:txBody>
-          <a:bodyPr wrap="none">
-            <a:spAutoFit/>
-          </a:bodyPr>
-          <a:lstStyle/>
-          <a:p>
-            <a:pPr algn="ctr">
-              <a:defRPr sz="2400">
-                <a:solidFill>
-                  <a:srgbClr val="FFFF00"/>
-                </a:solidFill>
-                <a:latin typeface="微軟正黑體"/>
-              </a:defRPr>
-            </a:pPr>
-            <a:r>
-              <a:t>將天敞開</a:t>
-            </a:r>
-          </a:p>
-        </p:txBody>
-      </p:sp>
-    </p:spTree>
-  </p:cSld>
-  <p:clrMapOvr>
-    <a:masterClrMapping/>
-  </p:clrMapOvr>
-</p:sld>
-</file>
-
-<file path=ppt/slides/slide11.xml><?xml version="1.0" encoding="utf-8"?>
-<p:sld xmlns:a="http://schemas.openxmlformats.org/drawingml/2006/main" xmlns:p="http://schemas.openxmlformats.org/presentationml/2006/main" xmlns:r="http://schemas.openxmlformats.org/officeDocument/2006/relationships">
-  <p:cSld>
-    <p:bg>
-      <p:bgPr>
-        <a:solidFill>
-          <a:srgbClr val="000000"/>
-        </a:solidFill>
-        <a:effectLst/>
-      </p:bgPr>
-    </p:bg>
-    <p:spTree>
-      <p:nvGrpSpPr>
-        <p:cNvPr id="1" name=""/>
-        <p:cNvGrpSpPr/>
-        <p:nvPr/>
-      </p:nvGrpSpPr>
-      <p:grpSpPr/>
-      <p:sp>
-        <p:nvSpPr>
-          <p:cNvPr id="2" name="TextBox 1"/>
-          <p:cNvSpPr txBox="1"/>
-          <p:nvPr/>
-        </p:nvSpPr>
-        <p:spPr>
-          <a:xfrm>
-            <a:off x="914400" y="91440"/>
-            <a:ext cx="12801600" cy="6858000"/>
-          </a:xfrm>
-          <a:prstGeom prst="rect">
-            <a:avLst/>
-          </a:prstGeom>
-          <a:noFill/>
-        </p:spPr>
-        <p:txBody>
-          <a:bodyPr wrap="square" anchor="t">
-            <a:spAutoFit/>
-          </a:bodyPr>
-          <a:lstStyle/>
-          <a:p>
-            <a:pPr algn="ctr">
-              <a:defRPr sz="4400" b="1">
-                <a:solidFill>
-                  <a:srgbClr val="FFFF00"/>
-                </a:solidFill>
-                <a:latin typeface="微軟正黑體"/>
-              </a:defRPr>
-            </a:pPr>
-            <a:r>
-              <a:t>天上地下 在永恆裡敬拜</a:t>
-            </a:r>
-          </a:p>
-          <a:p>
-            <a:pPr algn="ctr">
-              <a:defRPr sz="4400" b="1">
-                <a:solidFill>
-                  <a:srgbClr val="FFFF00"/>
-                </a:solidFill>
-                <a:latin typeface="微軟正黑體"/>
-              </a:defRPr>
-            </a:pPr>
-            <a:r>
-              <a:t>哈利路亞 哈利路亞</a:t>
-            </a:r>
-          </a:p>
-        </p:txBody>
-      </p:sp>
-      <p:sp>
-        <p:nvSpPr>
-          <p:cNvPr id="3" name="TextBox 2"/>
-          <p:cNvSpPr txBox="1"/>
-          <p:nvPr/>
-        </p:nvSpPr>
-        <p:spPr>
-          <a:xfrm>
-            <a:off x="914400" y="7543800"/>
-            <a:ext cx="12801600" cy="685800"/>
-          </a:xfrm>
-          <a:prstGeom prst="rect">
-            <a:avLst/>
-          </a:prstGeom>
-          <a:noFill/>
-        </p:spPr>
-        <p:txBody>
-          <a:bodyPr wrap="none">
-            <a:spAutoFit/>
-          </a:bodyPr>
-          <a:lstStyle/>
-          <a:p>
-            <a:pPr algn="ctr">
-              <a:defRPr sz="2400">
-                <a:solidFill>
-                  <a:srgbClr val="FFFF00"/>
-                </a:solidFill>
-                <a:latin typeface="微軟正黑體"/>
-              </a:defRPr>
-            </a:pPr>
-            <a:r>
-              <a:t>將天敞開</a:t>
-            </a:r>
-          </a:p>
-        </p:txBody>
-      </p:sp>
-    </p:spTree>
-  </p:cSld>
-  <p:clrMapOvr>
-    <a:masterClrMapping/>
-  </p:clrMapOvr>
-</p:sld>
-</file>
-
-<file path=ppt/slides/slide12.xml><?xml version="1.0" encoding="utf-8"?>
-<p:sld xmlns:a="http://schemas.openxmlformats.org/drawingml/2006/main" xmlns:p="http://schemas.openxmlformats.org/presentationml/2006/main" xmlns:r="http://schemas.openxmlformats.org/officeDocument/2006/relationships">
-  <p:cSld>
-    <p:bg>
-      <p:bgPr>
-        <a:solidFill>
-          <a:srgbClr val="000000"/>
-        </a:solidFill>
-        <a:effectLst/>
-      </p:bgPr>
-    </p:bg>
-    <p:spTree>
-      <p:nvGrpSpPr>
-        <p:cNvPr id="1" name=""/>
-        <p:cNvGrpSpPr/>
-        <p:nvPr/>
-      </p:nvGrpSpPr>
-      <p:grpSpPr/>
-      <p:sp>
-        <p:nvSpPr>
-          <p:cNvPr id="2" name="TextBox 1"/>
-          <p:cNvSpPr txBox="1"/>
-          <p:nvPr/>
-        </p:nvSpPr>
-        <p:spPr>
-          <a:xfrm>
-            <a:off x="914400" y="91440"/>
-            <a:ext cx="12801600" cy="6858000"/>
-          </a:xfrm>
-          <a:prstGeom prst="rect">
-            <a:avLst/>
-          </a:prstGeom>
-          <a:noFill/>
-        </p:spPr>
-        <p:txBody>
-          <a:bodyPr wrap="square" anchor="t">
-            <a:spAutoFit/>
-          </a:bodyPr>
-          <a:lstStyle/>
-          <a:p>
-            <a:pPr algn="ctr">
-              <a:defRPr sz="4400" b="1">
-                <a:solidFill>
-                  <a:srgbClr val="FFFF00"/>
-                </a:solidFill>
-                <a:latin typeface="微軟正黑體"/>
-              </a:defRPr>
-            </a:pPr>
-            <a:r>
-              <a:t>§ 神就在這裡 我們歡迎祢</a:t>
-            </a:r>
-          </a:p>
-          <a:p>
-            <a:pPr algn="ctr">
-              <a:defRPr sz="4400" b="1">
-                <a:solidFill>
-                  <a:srgbClr val="FFFF00"/>
-                </a:solidFill>
-                <a:latin typeface="微軟正黑體"/>
-              </a:defRPr>
-            </a:pPr>
-            <a:r>
-              <a:t>讓一切焦點轉向祢</a:t>
-            </a:r>
-          </a:p>
-        </p:txBody>
-      </p:sp>
-      <p:sp>
-        <p:nvSpPr>
-          <p:cNvPr id="3" name="TextBox 2"/>
-          <p:cNvSpPr txBox="1"/>
-          <p:nvPr/>
-        </p:nvSpPr>
-        <p:spPr>
-          <a:xfrm>
-            <a:off x="914400" y="7543800"/>
-            <a:ext cx="12801600" cy="685800"/>
-          </a:xfrm>
-          <a:prstGeom prst="rect">
-            <a:avLst/>
-          </a:prstGeom>
-          <a:noFill/>
-        </p:spPr>
-        <p:txBody>
-          <a:bodyPr wrap="none">
-            <a:spAutoFit/>
-          </a:bodyPr>
-          <a:lstStyle/>
-          <a:p>
-            <a:pPr algn="ctr">
-              <a:defRPr sz="2400">
-                <a:solidFill>
-                  <a:srgbClr val="FFFF00"/>
-                </a:solidFill>
-                <a:latin typeface="微軟正黑體"/>
-              </a:defRPr>
-            </a:pPr>
-            <a:r>
-              <a:t>將天敞開</a:t>
-            </a:r>
-          </a:p>
-        </p:txBody>
-      </p:sp>
-    </p:spTree>
-  </p:cSld>
-  <p:clrMapOvr>
-    <a:masterClrMapping/>
-  </p:clrMapOvr>
-</p:sld>
-</file>
-
-<file path=ppt/slides/slide13.xml><?xml version="1.0" encoding="utf-8"?>
-<p:sld xmlns:a="http://schemas.openxmlformats.org/drawingml/2006/main" xmlns:p="http://schemas.openxmlformats.org/presentationml/2006/main" xmlns:r="http://schemas.openxmlformats.org/officeDocument/2006/relationships">
-  <p:cSld>
-    <p:bg>
-      <p:bgPr>
-        <a:solidFill>
-          <a:srgbClr val="000000"/>
-        </a:solidFill>
-        <a:effectLst/>
-      </p:bgPr>
-    </p:bg>
-    <p:spTree>
-      <p:nvGrpSpPr>
-        <p:cNvPr id="1" name=""/>
-        <p:cNvGrpSpPr/>
-        <p:nvPr/>
-      </p:nvGrpSpPr>
-      <p:grpSpPr/>
-      <p:sp>
-        <p:nvSpPr>
-          <p:cNvPr id="2" name="TextBox 1"/>
-          <p:cNvSpPr txBox="1"/>
-          <p:nvPr/>
-        </p:nvSpPr>
-        <p:spPr>
-          <a:xfrm>
-            <a:off x="914400" y="91440"/>
-            <a:ext cx="12801600" cy="6858000"/>
-          </a:xfrm>
-          <a:prstGeom prst="rect">
-            <a:avLst/>
-          </a:prstGeom>
-          <a:noFill/>
-        </p:spPr>
-        <p:txBody>
-          <a:bodyPr wrap="square" anchor="t">
-            <a:spAutoFit/>
-          </a:bodyPr>
-          <a:lstStyle/>
-          <a:p>
-            <a:pPr algn="ctr">
-              <a:defRPr sz="4400" b="1">
-                <a:solidFill>
-                  <a:srgbClr val="FFFF00"/>
-                </a:solidFill>
-                <a:latin typeface="微軟正黑體"/>
-              </a:defRPr>
-            </a:pPr>
-            <a:r>
-              <a:t>神就在這裡 我們歡迎祢</a:t>
-            </a:r>
-          </a:p>
-          <a:p>
-            <a:pPr algn="ctr">
-              <a:defRPr sz="4400" b="1">
-                <a:solidFill>
-                  <a:srgbClr val="FFFF00"/>
-                </a:solidFill>
-                <a:latin typeface="微軟正黑體"/>
-              </a:defRPr>
-            </a:pPr>
-            <a:r>
-              <a:t>寶座前敬拜不停息</a:t>
-            </a:r>
-          </a:p>
-        </p:txBody>
-      </p:sp>
-      <p:sp>
-        <p:nvSpPr>
-          <p:cNvPr id="3" name="TextBox 2"/>
-          <p:cNvSpPr txBox="1"/>
-          <p:nvPr/>
-        </p:nvSpPr>
-        <p:spPr>
-          <a:xfrm>
-            <a:off x="914400" y="7543800"/>
-            <a:ext cx="12801600" cy="685800"/>
-          </a:xfrm>
-          <a:prstGeom prst="rect">
-            <a:avLst/>
-          </a:prstGeom>
-          <a:noFill/>
-        </p:spPr>
-        <p:txBody>
-          <a:bodyPr wrap="none">
-            <a:spAutoFit/>
-          </a:bodyPr>
-          <a:lstStyle/>
-          <a:p>
-            <a:pPr algn="ctr">
-              <a:defRPr sz="2400">
-                <a:solidFill>
-                  <a:srgbClr val="FFFF00"/>
-                </a:solidFill>
-                <a:latin typeface="微軟正黑體"/>
-              </a:defRPr>
-            </a:pPr>
-            <a:r>
-              <a:t>將天敞開</a:t>
-            </a:r>
-          </a:p>
-        </p:txBody>
-      </p:sp>
-    </p:spTree>
-  </p:cSld>
-  <p:clrMapOvr>
-    <a:masterClrMapping/>
-  </p:clrMapOvr>
-</p:sld>
-</file>
-
-<file path=ppt/slides/slide14.xml><?xml version="1.0" encoding="utf-8"?>
-<p:sld xmlns:a="http://schemas.openxmlformats.org/drawingml/2006/main" xmlns:p="http://schemas.openxmlformats.org/presentationml/2006/main" xmlns:r="http://schemas.openxmlformats.org/officeDocument/2006/relationships">
-  <p:cSld>
-    <p:bg>
-      <p:bgPr>
-        <a:solidFill>
-          <a:srgbClr val="000000"/>
-        </a:solidFill>
-        <a:effectLst/>
-      </p:bgPr>
-    </p:bg>
-    <p:spTree>
-      <p:nvGrpSpPr>
-        <p:cNvPr id="1" name=""/>
-        <p:cNvGrpSpPr/>
-        <p:nvPr/>
-      </p:nvGrpSpPr>
-      <p:grpSpPr/>
-      <p:sp>
-        <p:nvSpPr>
-          <p:cNvPr id="2" name="TextBox 1"/>
-          <p:cNvSpPr txBox="1"/>
-          <p:nvPr/>
-        </p:nvSpPr>
-        <p:spPr>
-          <a:xfrm>
-            <a:off x="914400" y="91440"/>
-            <a:ext cx="12801600" cy="6858000"/>
-          </a:xfrm>
-          <a:prstGeom prst="rect">
-            <a:avLst/>
-          </a:prstGeom>
-          <a:noFill/>
-        </p:spPr>
-        <p:txBody>
-          <a:bodyPr wrap="square" anchor="t">
-            <a:spAutoFit/>
-          </a:bodyPr>
-          <a:lstStyle/>
-          <a:p>
-            <a:pPr algn="ctr">
-              <a:defRPr sz="4400" b="1">
-                <a:solidFill>
-                  <a:srgbClr val="FFFF00"/>
-                </a:solidFill>
-                <a:latin typeface="微軟正黑體"/>
-              </a:defRPr>
-            </a:pPr>
-            <a:r>
-              <a:t>1.敬拜永活獨一的真神</a:t>
-            </a:r>
-          </a:p>
-          <a:p>
-            <a:pPr algn="ctr">
-              <a:defRPr sz="4400" b="1">
-                <a:solidFill>
-                  <a:srgbClr val="FFFF00"/>
-                </a:solidFill>
-                <a:latin typeface="微軟正黑體"/>
-              </a:defRPr>
-            </a:pPr>
-            <a:r>
-              <a:t>榮耀在全地彰顯永遠不改變</a:t>
-            </a:r>
-          </a:p>
-        </p:txBody>
-      </p:sp>
-      <p:sp>
-        <p:nvSpPr>
-          <p:cNvPr id="3" name="TextBox 2"/>
-          <p:cNvSpPr txBox="1"/>
-          <p:nvPr/>
-        </p:nvSpPr>
-        <p:spPr>
-          <a:xfrm>
-            <a:off x="914400" y="7543800"/>
-            <a:ext cx="12801600" cy="685800"/>
-          </a:xfrm>
-          <a:prstGeom prst="rect">
-            <a:avLst/>
-          </a:prstGeom>
-          <a:noFill/>
-        </p:spPr>
-        <p:txBody>
-          <a:bodyPr wrap="none">
-            <a:spAutoFit/>
-          </a:bodyPr>
-          <a:lstStyle/>
-          <a:p>
-            <a:pPr algn="ctr">
-              <a:defRPr sz="2400">
-                <a:solidFill>
-                  <a:srgbClr val="FFFF00"/>
-                </a:solidFill>
-                <a:latin typeface="微軟正黑體"/>
-              </a:defRPr>
-            </a:pPr>
-            <a:r>
-              <a:t>神掌權</a:t>
-            </a:r>
-          </a:p>
-        </p:txBody>
-      </p:sp>
-    </p:spTree>
-  </p:cSld>
-  <p:clrMapOvr>
-    <a:masterClrMapping/>
-  </p:clrMapOvr>
-</p:sld>
-</file>
-
-<file path=ppt/slides/slide15.xml><?xml version="1.0" encoding="utf-8"?>
-<p:sld xmlns:a="http://schemas.openxmlformats.org/drawingml/2006/main" xmlns:p="http://schemas.openxmlformats.org/presentationml/2006/main" xmlns:r="http://schemas.openxmlformats.org/officeDocument/2006/relationships">
-  <p:cSld>
-    <p:bg>
-      <p:bgPr>
-        <a:solidFill>
-          <a:srgbClr val="000000"/>
-        </a:solidFill>
-        <a:effectLst/>
-      </p:bgPr>
-    </p:bg>
-    <p:spTree>
-      <p:nvGrpSpPr>
-        <p:cNvPr id="1" name=""/>
-        <p:cNvGrpSpPr/>
-        <p:nvPr/>
-      </p:nvGrpSpPr>
-      <p:grpSpPr/>
-      <p:sp>
-        <p:nvSpPr>
-          <p:cNvPr id="2" name="TextBox 1"/>
-          <p:cNvSpPr txBox="1"/>
-          <p:nvPr/>
-        </p:nvSpPr>
-        <p:spPr>
-          <a:xfrm>
-            <a:off x="914400" y="91440"/>
-            <a:ext cx="12801600" cy="6858000"/>
-          </a:xfrm>
-          <a:prstGeom prst="rect">
-            <a:avLst/>
-          </a:prstGeom>
-          <a:noFill/>
-        </p:spPr>
-        <p:txBody>
-          <a:bodyPr wrap="square" anchor="t">
-            <a:spAutoFit/>
-          </a:bodyPr>
-          <a:lstStyle/>
-          <a:p>
-            <a:pPr algn="ctr">
-              <a:defRPr sz="4400" b="1">
-                <a:solidFill>
-                  <a:srgbClr val="FFFF00"/>
-                </a:solidFill>
-                <a:latin typeface="微軟正黑體"/>
-              </a:defRPr>
-            </a:pPr>
-            <a:r>
-              <a:t>國度權柄能力歸給祂</a:t>
-            </a:r>
-          </a:p>
-          <a:p>
-            <a:pPr algn="ctr">
-              <a:defRPr sz="4400" b="1">
-                <a:solidFill>
-                  <a:srgbClr val="FFFF00"/>
-                </a:solidFill>
-                <a:latin typeface="微軟正黑體"/>
-              </a:defRPr>
-            </a:pPr>
-            <a:r>
-              <a:t>公義慈愛顯威嚴 亙古到永遠</a:t>
-            </a:r>
-          </a:p>
-        </p:txBody>
-      </p:sp>
-      <p:sp>
-        <p:nvSpPr>
-          <p:cNvPr id="3" name="TextBox 2"/>
-          <p:cNvSpPr txBox="1"/>
-          <p:nvPr/>
-        </p:nvSpPr>
-        <p:spPr>
-          <a:xfrm>
-            <a:off x="914400" y="7543800"/>
-            <a:ext cx="12801600" cy="685800"/>
-          </a:xfrm>
-          <a:prstGeom prst="rect">
-            <a:avLst/>
-          </a:prstGeom>
-          <a:noFill/>
-        </p:spPr>
-        <p:txBody>
-          <a:bodyPr wrap="none">
-            <a:spAutoFit/>
-          </a:bodyPr>
-          <a:lstStyle/>
-          <a:p>
-            <a:pPr algn="ctr">
-              <a:defRPr sz="2400">
-                <a:solidFill>
-                  <a:srgbClr val="FFFF00"/>
-                </a:solidFill>
-                <a:latin typeface="微軟正黑體"/>
-              </a:defRPr>
-            </a:pPr>
-            <a:r>
-              <a:t>神掌權</a:t>
-            </a:r>
-          </a:p>
-        </p:txBody>
-      </p:sp>
-    </p:spTree>
-  </p:cSld>
-  <p:clrMapOvr>
-    <a:masterClrMapping/>
-  </p:clrMapOvr>
-</p:sld>
-</file>
-
-<file path=ppt/slides/slide16.xml><?xml version="1.0" encoding="utf-8"?>
-<p:sld xmlns:a="http://schemas.openxmlformats.org/drawingml/2006/main" xmlns:p="http://schemas.openxmlformats.org/presentationml/2006/main" xmlns:r="http://schemas.openxmlformats.org/officeDocument/2006/relationships">
-  <p:cSld>
-    <p:bg>
-      <p:bgPr>
-        <a:solidFill>
-          <a:srgbClr val="000000"/>
-        </a:solidFill>
-        <a:effectLst/>
-      </p:bgPr>
-    </p:bg>
-    <p:spTree>
-      <p:nvGrpSpPr>
-        <p:cNvPr id="1" name=""/>
-        <p:cNvGrpSpPr/>
-        <p:nvPr/>
-      </p:nvGrpSpPr>
-      <p:grpSpPr/>
-      <p:sp>
-        <p:nvSpPr>
-          <p:cNvPr id="2" name="TextBox 1"/>
-          <p:cNvSpPr txBox="1"/>
-          <p:nvPr/>
-        </p:nvSpPr>
-        <p:spPr>
-          <a:xfrm>
-            <a:off x="914400" y="91440"/>
-            <a:ext cx="12801600" cy="6858000"/>
-          </a:xfrm>
-          <a:prstGeom prst="rect">
-            <a:avLst/>
-          </a:prstGeom>
-          <a:noFill/>
-        </p:spPr>
-        <p:txBody>
-          <a:bodyPr wrap="square" anchor="t">
-            <a:spAutoFit/>
-          </a:bodyPr>
-          <a:lstStyle/>
-          <a:p>
-            <a:pPr algn="ctr">
-              <a:defRPr sz="4400" b="1">
-                <a:solidFill>
-                  <a:srgbClr val="FFFF00"/>
-                </a:solidFill>
-                <a:latin typeface="微軟正黑體"/>
-              </a:defRPr>
-            </a:pPr>
-            <a:r>
-              <a:t>c1.神掌權到永遠 在天地之間</a:t>
-            </a:r>
-          </a:p>
-          <a:p>
-            <a:pPr algn="ctr">
-              <a:defRPr sz="4400" b="1">
-                <a:solidFill>
-                  <a:srgbClr val="FFFF00"/>
-                </a:solidFill>
-                <a:latin typeface="微軟正黑體"/>
-              </a:defRPr>
-            </a:pPr>
-            <a:r>
-              <a:t>立晨星鋪穹蒼 劃出地平線</a:t>
-            </a:r>
-          </a:p>
-        </p:txBody>
-      </p:sp>
-      <p:sp>
-        <p:nvSpPr>
-          <p:cNvPr id="3" name="TextBox 2"/>
-          <p:cNvSpPr txBox="1"/>
-          <p:nvPr/>
-        </p:nvSpPr>
-        <p:spPr>
-          <a:xfrm>
-            <a:off x="914400" y="7543800"/>
-            <a:ext cx="12801600" cy="685800"/>
-          </a:xfrm>
-          <a:prstGeom prst="rect">
-            <a:avLst/>
-          </a:prstGeom>
-          <a:noFill/>
-        </p:spPr>
-        <p:txBody>
-          <a:bodyPr wrap="none">
-            <a:spAutoFit/>
-          </a:bodyPr>
-          <a:lstStyle/>
-          <a:p>
-            <a:pPr algn="ctr">
-              <a:defRPr sz="2400">
-                <a:solidFill>
-                  <a:srgbClr val="FFFF00"/>
-                </a:solidFill>
-                <a:latin typeface="微軟正黑體"/>
-              </a:defRPr>
-            </a:pPr>
-            <a:r>
-              <a:t>神掌權</a:t>
-            </a:r>
-          </a:p>
-        </p:txBody>
-      </p:sp>
-    </p:spTree>
-  </p:cSld>
-  <p:clrMapOvr>
-    <a:masterClrMapping/>
-  </p:clrMapOvr>
-</p:sld>
-</file>
-
-<file path=ppt/slides/slide17.xml><?xml version="1.0" encoding="utf-8"?>
-<p:sld xmlns:a="http://schemas.openxmlformats.org/drawingml/2006/main" xmlns:p="http://schemas.openxmlformats.org/presentationml/2006/main" xmlns:r="http://schemas.openxmlformats.org/officeDocument/2006/relationships">
-  <p:cSld>
-    <p:bg>
-      <p:bgPr>
-        <a:solidFill>
-          <a:srgbClr val="000000"/>
-        </a:solidFill>
-        <a:effectLst/>
-      </p:bgPr>
-    </p:bg>
-    <p:spTree>
-      <p:nvGrpSpPr>
-        <p:cNvPr id="1" name=""/>
-        <p:cNvGrpSpPr/>
-        <p:nvPr/>
-      </p:nvGrpSpPr>
-      <p:grpSpPr/>
-      <p:sp>
-        <p:nvSpPr>
-          <p:cNvPr id="2" name="TextBox 1"/>
-          <p:cNvSpPr txBox="1"/>
-          <p:nvPr/>
-        </p:nvSpPr>
-        <p:spPr>
-          <a:xfrm>
-            <a:off x="914400" y="91440"/>
-            <a:ext cx="12801600" cy="6858000"/>
-          </a:xfrm>
-          <a:prstGeom prst="rect">
-            <a:avLst/>
-          </a:prstGeom>
-          <a:noFill/>
-        </p:spPr>
-        <p:txBody>
-          <a:bodyPr wrap="square" anchor="t">
-            <a:spAutoFit/>
-          </a:bodyPr>
-          <a:lstStyle/>
-          <a:p>
-            <a:pPr algn="ctr">
-              <a:defRPr sz="4400" b="1">
-                <a:solidFill>
-                  <a:srgbClr val="FFFF00"/>
-                </a:solidFill>
-                <a:latin typeface="微軟正黑體"/>
-              </a:defRPr>
-            </a:pPr>
-            <a:r>
-              <a:t>降恩雨賜豐年 海不越過界</a:t>
-            </a:r>
-          </a:p>
-          <a:p>
-            <a:pPr algn="ctr">
-              <a:defRPr sz="4400" b="1">
-                <a:solidFill>
-                  <a:srgbClr val="FFFF00"/>
-                </a:solidFill>
-                <a:latin typeface="微軟正黑體"/>
-              </a:defRPr>
-            </a:pPr>
-            <a:r>
-              <a:t>神掌權到永遠</a:t>
-            </a:r>
-          </a:p>
-        </p:txBody>
-      </p:sp>
-      <p:sp>
-        <p:nvSpPr>
-          <p:cNvPr id="3" name="TextBox 2"/>
-          <p:cNvSpPr txBox="1"/>
-          <p:nvPr/>
-        </p:nvSpPr>
-        <p:spPr>
-          <a:xfrm>
-            <a:off x="914400" y="7543800"/>
-            <a:ext cx="12801600" cy="685800"/>
-          </a:xfrm>
-          <a:prstGeom prst="rect">
-            <a:avLst/>
-          </a:prstGeom>
-          <a:noFill/>
-        </p:spPr>
-        <p:txBody>
-          <a:bodyPr wrap="none">
-            <a:spAutoFit/>
-          </a:bodyPr>
-          <a:lstStyle/>
-          <a:p>
-            <a:pPr algn="ctr">
-              <a:defRPr sz="2400">
-                <a:solidFill>
-                  <a:srgbClr val="FFFF00"/>
-                </a:solidFill>
-                <a:latin typeface="微軟正黑體"/>
-              </a:defRPr>
-            </a:pPr>
-            <a:r>
-              <a:t>神掌權</a:t>
-            </a:r>
-          </a:p>
-        </p:txBody>
-      </p:sp>
-    </p:spTree>
-  </p:cSld>
-  <p:clrMapOvr>
-    <a:masterClrMapping/>
-  </p:clrMapOvr>
-</p:sld>
-</file>
-
-<file path=ppt/slides/slide18.xml><?xml version="1.0" encoding="utf-8"?>
-<p:sld xmlns:a="http://schemas.openxmlformats.org/drawingml/2006/main" xmlns:p="http://schemas.openxmlformats.org/presentationml/2006/main" xmlns:r="http://schemas.openxmlformats.org/officeDocument/2006/relationships">
-  <p:cSld>
-    <p:bg>
-      <p:bgPr>
-        <a:solidFill>
-          <a:srgbClr val="000000"/>
-        </a:solidFill>
-        <a:effectLst/>
-      </p:bgPr>
-    </p:bg>
-    <p:spTree>
-      <p:nvGrpSpPr>
-        <p:cNvPr id="1" name=""/>
-        <p:cNvGrpSpPr/>
-        <p:nvPr/>
-      </p:nvGrpSpPr>
-      <p:grpSpPr/>
-      <p:sp>
-        <p:nvSpPr>
-          <p:cNvPr id="2" name="TextBox 1"/>
-          <p:cNvSpPr txBox="1"/>
-          <p:nvPr/>
-        </p:nvSpPr>
-        <p:spPr>
-          <a:xfrm>
-            <a:off x="914400" y="91440"/>
-            <a:ext cx="12801600" cy="6858000"/>
-          </a:xfrm>
-          <a:prstGeom prst="rect">
-            <a:avLst/>
-          </a:prstGeom>
-          <a:noFill/>
-        </p:spPr>
-        <p:txBody>
-          <a:bodyPr wrap="square" anchor="t">
-            <a:spAutoFit/>
-          </a:bodyPr>
-          <a:lstStyle/>
-          <a:p>
-            <a:pPr algn="ctr">
-              <a:defRPr sz="4400" b="1">
-                <a:solidFill>
-                  <a:srgbClr val="FFFF00"/>
-                </a:solidFill>
-                <a:latin typeface="微軟正黑體"/>
-              </a:defRPr>
-            </a:pPr>
-            <a:r>
-              <a:t>c2.神掌權到永遠 在天地之間</a:t>
-            </a:r>
-          </a:p>
-          <a:p>
-            <a:pPr algn="ctr">
-              <a:defRPr sz="4400" b="1">
-                <a:solidFill>
-                  <a:srgbClr val="FFFF00"/>
-                </a:solidFill>
-                <a:latin typeface="微軟正黑體"/>
-              </a:defRPr>
-            </a:pPr>
-            <a:r>
-              <a:t>造白晝管黑夜 寒暑不停歇</a:t>
-            </a:r>
-          </a:p>
-        </p:txBody>
-      </p:sp>
-      <p:sp>
-        <p:nvSpPr>
-          <p:cNvPr id="3" name="TextBox 2"/>
-          <p:cNvSpPr txBox="1"/>
-          <p:nvPr/>
-        </p:nvSpPr>
-        <p:spPr>
-          <a:xfrm>
-            <a:off x="914400" y="7543800"/>
-            <a:ext cx="12801600" cy="685800"/>
-          </a:xfrm>
-          <a:prstGeom prst="rect">
-            <a:avLst/>
-          </a:prstGeom>
-          <a:noFill/>
-        </p:spPr>
-        <p:txBody>
-          <a:bodyPr wrap="none">
-            <a:spAutoFit/>
-          </a:bodyPr>
-          <a:lstStyle/>
-          <a:p>
-            <a:pPr algn="ctr">
-              <a:defRPr sz="2400">
-                <a:solidFill>
-                  <a:srgbClr val="FFFF00"/>
-                </a:solidFill>
-                <a:latin typeface="微軟正黑體"/>
-              </a:defRPr>
-            </a:pPr>
-            <a:r>
-              <a:t>神掌權</a:t>
-            </a:r>
-          </a:p>
-        </p:txBody>
-      </p:sp>
-    </p:spTree>
-  </p:cSld>
-  <p:clrMapOvr>
-    <a:masterClrMapping/>
-  </p:clrMapOvr>
-</p:sld>
-</file>
-
-<file path=ppt/slides/slide19.xml><?xml version="1.0" encoding="utf-8"?>
-<p:sld xmlns:a="http://schemas.openxmlformats.org/drawingml/2006/main" xmlns:p="http://schemas.openxmlformats.org/presentationml/2006/main" xmlns:r="http://schemas.openxmlformats.org/officeDocument/2006/relationships">
-  <p:cSld>
-    <p:bg>
-      <p:bgPr>
-        <a:solidFill>
-          <a:srgbClr val="000000"/>
-        </a:solidFill>
-        <a:effectLst/>
-      </p:bgPr>
-    </p:bg>
-    <p:spTree>
-      <p:nvGrpSpPr>
-        <p:cNvPr id="1" name=""/>
-        <p:cNvGrpSpPr/>
-        <p:nvPr/>
-      </p:nvGrpSpPr>
-      <p:grpSpPr/>
-      <p:sp>
-        <p:nvSpPr>
-          <p:cNvPr id="2" name="TextBox 1"/>
-          <p:cNvSpPr txBox="1"/>
-          <p:nvPr/>
-        </p:nvSpPr>
-        <p:spPr>
-          <a:xfrm>
-            <a:off x="914400" y="91440"/>
-            <a:ext cx="12801600" cy="6858000"/>
-          </a:xfrm>
-          <a:prstGeom prst="rect">
-            <a:avLst/>
-          </a:prstGeom>
-          <a:noFill/>
-        </p:spPr>
-        <p:txBody>
-          <a:bodyPr wrap="square" anchor="t">
-            <a:spAutoFit/>
-          </a:bodyPr>
-          <a:lstStyle/>
-          <a:p>
-            <a:pPr algn="ctr">
-              <a:defRPr sz="4400" b="1">
-                <a:solidFill>
-                  <a:srgbClr val="FFFF00"/>
-                </a:solidFill>
-                <a:latin typeface="微軟正黑體"/>
-              </a:defRPr>
-            </a:pPr>
-            <a:r>
-              <a:t>施憐憫行拯救 向我們仰臉</a:t>
-            </a:r>
-          </a:p>
-          <a:p>
-            <a:pPr algn="ctr">
-              <a:defRPr sz="4400" b="1">
-                <a:solidFill>
-                  <a:srgbClr val="FFFF00"/>
-                </a:solidFill>
-                <a:latin typeface="微軟正黑體"/>
-              </a:defRPr>
-            </a:pPr>
-            <a:r>
-              <a:t>神掌權到永遠</a:t>
-            </a:r>
-          </a:p>
-        </p:txBody>
-      </p:sp>
-      <p:sp>
-        <p:nvSpPr>
-          <p:cNvPr id="3" name="TextBox 2"/>
-          <p:cNvSpPr txBox="1"/>
-          <p:nvPr/>
-        </p:nvSpPr>
-        <p:spPr>
-          <a:xfrm>
-            <a:off x="914400" y="7543800"/>
-            <a:ext cx="12801600" cy="685800"/>
-          </a:xfrm>
-          <a:prstGeom prst="rect">
-            <a:avLst/>
-          </a:prstGeom>
-          <a:noFill/>
-        </p:spPr>
-        <p:txBody>
-          <a:bodyPr wrap="none">
-            <a:spAutoFit/>
-          </a:bodyPr>
-          <a:lstStyle/>
-          <a:p>
-            <a:pPr algn="ctr">
-              <a:defRPr sz="2400">
-                <a:solidFill>
-                  <a:srgbClr val="FFFF00"/>
-                </a:solidFill>
-                <a:latin typeface="微軟正黑體"/>
-              </a:defRPr>
-            </a:pPr>
-            <a:r>
-              <a:t>神掌權</a:t>
+              </a:rPr>
+              <a:t>《讚美之泉》</a:t>
             </a:r>
           </a:p>
         </p:txBody>
@@ -4350,8 +3212,8 @@
         </p:nvSpPr>
         <p:spPr>
           <a:xfrm>
-            <a:off x="914400" y="91440"/>
-            <a:ext cx="12801600" cy="6858000"/>
+            <a:off x="457200" y="91440"/>
+            <a:ext cx="8229600" cy="2286000"/>
           </a:xfrm>
           <a:prstGeom prst="rect">
             <a:avLst/>
@@ -4359,34 +3221,30 @@
           <a:noFill/>
         </p:spPr>
         <p:txBody>
-          <a:bodyPr wrap="square" anchor="t">
+          <a:bodyPr wrap="none">
             <a:spAutoFit/>
           </a:bodyPr>
           <a:lstStyle/>
           <a:p>
-            <a:pPr algn="ctr">
-              <a:defRPr sz="4400" b="1">
+            <a:pPr algn="ctr"/>
+            <a:r>
+              <a:rPr sz="3200" b="1">
                 <a:solidFill>
                   <a:srgbClr val="FFFF00"/>
                 </a:solidFill>
                 <a:latin typeface="微軟正黑體"/>
-              </a:defRPr>
-            </a:pPr>
-            <a:r>
-              <a:t>願天歡喜 願地快樂</a:t>
-            </a:r>
-          </a:p>
-          <a:p>
-            <a:pPr algn="ctr">
-              <a:defRPr sz="4400" b="1">
+              </a:rPr>
+              <a:t>※ 我們張開口、舉起手 向永生之主稱謝</a:t>
+            </a:r>
+            <a:br/>
+            <a:r>
+              <a:rPr sz="3200" b="1">
                 <a:solidFill>
                   <a:srgbClr val="FFFF00"/>
                 </a:solidFill>
                 <a:latin typeface="微軟正黑體"/>
-              </a:defRPr>
-            </a:pPr>
-            <a:r>
-              <a:t>願田和其中所有的歡樂</a:t>
+              </a:rPr>
+              <a:t>使讚美之泉 流入每個人的心間 </a:t>
             </a:r>
           </a:p>
         </p:txBody>
@@ -4399,8 +3257,8 @@
         </p:nvSpPr>
         <p:spPr>
           <a:xfrm>
-            <a:off x="914400" y="7543800"/>
-            <a:ext cx="12801600" cy="685800"/>
+            <a:off x="457200" y="4663440"/>
+            <a:ext cx="8229600" cy="457200"/>
           </a:xfrm>
           <a:prstGeom prst="rect">
             <a:avLst/>
@@ -4413,793 +3271,15 @@
           </a:bodyPr>
           <a:lstStyle/>
           <a:p>
-            <a:pPr algn="ctr">
-              <a:defRPr sz="2400">
+            <a:pPr algn="ctr"/>
+            <a:r>
+              <a:rPr sz="2000" b="0">
                 <a:solidFill>
                   <a:srgbClr val="FFFF00"/>
                 </a:solidFill>
                 <a:latin typeface="微軟正黑體"/>
-              </a:defRPr>
-            </a:pPr>
-            <a:r>
-              <a:t>來歡呼來讚美</a:t>
-            </a:r>
-          </a:p>
-        </p:txBody>
-      </p:sp>
-    </p:spTree>
-  </p:cSld>
-  <p:clrMapOvr>
-    <a:masterClrMapping/>
-  </p:clrMapOvr>
-</p:sld>
-</file>
-
-<file path=ppt/slides/slide20.xml><?xml version="1.0" encoding="utf-8"?>
-<p:sld xmlns:a="http://schemas.openxmlformats.org/drawingml/2006/main" xmlns:p="http://schemas.openxmlformats.org/presentationml/2006/main" xmlns:r="http://schemas.openxmlformats.org/officeDocument/2006/relationships">
-  <p:cSld>
-    <p:bg>
-      <p:bgPr>
-        <a:solidFill>
-          <a:srgbClr val="000000"/>
-        </a:solidFill>
-        <a:effectLst/>
-      </p:bgPr>
-    </p:bg>
-    <p:spTree>
-      <p:nvGrpSpPr>
-        <p:cNvPr id="1" name=""/>
-        <p:cNvGrpSpPr/>
-        <p:nvPr/>
-      </p:nvGrpSpPr>
-      <p:grpSpPr/>
-      <p:sp>
-        <p:nvSpPr>
-          <p:cNvPr id="2" name="TextBox 1"/>
-          <p:cNvSpPr txBox="1"/>
-          <p:nvPr/>
-        </p:nvSpPr>
-        <p:spPr>
-          <a:xfrm>
-            <a:off x="914400" y="91440"/>
-            <a:ext cx="12801600" cy="6858000"/>
-          </a:xfrm>
-          <a:prstGeom prst="rect">
-            <a:avLst/>
-          </a:prstGeom>
-          <a:noFill/>
-        </p:spPr>
-        <p:txBody>
-          <a:bodyPr wrap="square" anchor="t">
-            <a:spAutoFit/>
-          </a:bodyPr>
-          <a:lstStyle/>
-          <a:p>
-            <a:pPr algn="ctr">
-              <a:defRPr sz="4400" b="1">
-                <a:solidFill>
-                  <a:srgbClr val="FFFF00"/>
-                </a:solidFill>
-                <a:latin typeface="微軟正黑體"/>
-              </a:defRPr>
-            </a:pPr>
-            <a:r>
-              <a:t>b.耶和華做王 世界堅定不動搖</a:t>
-            </a:r>
-          </a:p>
-          <a:p>
-            <a:pPr algn="ctr">
-              <a:defRPr sz="4400" b="1">
-                <a:solidFill>
-                  <a:srgbClr val="FFFF00"/>
-                </a:solidFill>
-                <a:latin typeface="微軟正黑體"/>
-              </a:defRPr>
-            </a:pPr>
-            <a:r>
-              <a:t>耶和華做王 地的四極都看見</a:t>
-            </a:r>
-          </a:p>
-        </p:txBody>
-      </p:sp>
-      <p:sp>
-        <p:nvSpPr>
-          <p:cNvPr id="3" name="TextBox 2"/>
-          <p:cNvSpPr txBox="1"/>
-          <p:nvPr/>
-        </p:nvSpPr>
-        <p:spPr>
-          <a:xfrm>
-            <a:off x="914400" y="7543800"/>
-            <a:ext cx="12801600" cy="685800"/>
-          </a:xfrm>
-          <a:prstGeom prst="rect">
-            <a:avLst/>
-          </a:prstGeom>
-          <a:noFill/>
-        </p:spPr>
-        <p:txBody>
-          <a:bodyPr wrap="none">
-            <a:spAutoFit/>
-          </a:bodyPr>
-          <a:lstStyle/>
-          <a:p>
-            <a:pPr algn="ctr">
-              <a:defRPr sz="2400">
-                <a:solidFill>
-                  <a:srgbClr val="FFFF00"/>
-                </a:solidFill>
-                <a:latin typeface="微軟正黑體"/>
-              </a:defRPr>
-            </a:pPr>
-            <a:r>
-              <a:t>神掌權</a:t>
-            </a:r>
-          </a:p>
-        </p:txBody>
-      </p:sp>
-    </p:spTree>
-  </p:cSld>
-  <p:clrMapOvr>
-    <a:masterClrMapping/>
-  </p:clrMapOvr>
-</p:sld>
-</file>
-
-<file path=ppt/slides/slide21.xml><?xml version="1.0" encoding="utf-8"?>
-<p:sld xmlns:a="http://schemas.openxmlformats.org/drawingml/2006/main" xmlns:p="http://schemas.openxmlformats.org/presentationml/2006/main" xmlns:r="http://schemas.openxmlformats.org/officeDocument/2006/relationships">
-  <p:cSld>
-    <p:bg>
-      <p:bgPr>
-        <a:solidFill>
-          <a:srgbClr val="000000"/>
-        </a:solidFill>
-        <a:effectLst/>
-      </p:bgPr>
-    </p:bg>
-    <p:spTree>
-      <p:nvGrpSpPr>
-        <p:cNvPr id="1" name=""/>
-        <p:cNvGrpSpPr/>
-        <p:nvPr/>
-      </p:nvGrpSpPr>
-      <p:grpSpPr/>
-      <p:sp>
-        <p:nvSpPr>
-          <p:cNvPr id="2" name="TextBox 1"/>
-          <p:cNvSpPr txBox="1"/>
-          <p:nvPr/>
-        </p:nvSpPr>
-        <p:spPr>
-          <a:xfrm>
-            <a:off x="914400" y="91440"/>
-            <a:ext cx="12801600" cy="6858000"/>
-          </a:xfrm>
-          <a:prstGeom prst="rect">
-            <a:avLst/>
-          </a:prstGeom>
-          <a:noFill/>
-        </p:spPr>
-        <p:txBody>
-          <a:bodyPr wrap="square" anchor="t">
-            <a:spAutoFit/>
-          </a:bodyPr>
-          <a:lstStyle/>
-          <a:p>
-            <a:pPr algn="ctr">
-              <a:defRPr sz="4400" b="1">
-                <a:solidFill>
-                  <a:srgbClr val="FFFF00"/>
-                </a:solidFill>
-                <a:latin typeface="微軟正黑體"/>
-              </a:defRPr>
-            </a:pPr>
-            <a:r>
-              <a:t>1.當我在患難之中 我仍要信靠耶穌</a:t>
-            </a:r>
-          </a:p>
-          <a:p>
-            <a:pPr algn="ctr">
-              <a:defRPr sz="4400" b="1">
-                <a:solidFill>
-                  <a:srgbClr val="FFFF00"/>
-                </a:solidFill>
-                <a:latin typeface="微軟正黑體"/>
-              </a:defRPr>
-            </a:pPr>
-            <a:r>
-              <a:t>祢是我的一切 我心所依靠的</a:t>
-            </a:r>
-          </a:p>
-        </p:txBody>
-      </p:sp>
-      <p:sp>
-        <p:nvSpPr>
-          <p:cNvPr id="3" name="TextBox 2"/>
-          <p:cNvSpPr txBox="1"/>
-          <p:nvPr/>
-        </p:nvSpPr>
-        <p:spPr>
-          <a:xfrm>
-            <a:off x="914400" y="7543800"/>
-            <a:ext cx="12801600" cy="685800"/>
-          </a:xfrm>
-          <a:prstGeom prst="rect">
-            <a:avLst/>
-          </a:prstGeom>
-          <a:noFill/>
-        </p:spPr>
-        <p:txBody>
-          <a:bodyPr wrap="none">
-            <a:spAutoFit/>
-          </a:bodyPr>
-          <a:lstStyle/>
-          <a:p>
-            <a:pPr algn="ctr">
-              <a:defRPr sz="2400">
-                <a:solidFill>
-                  <a:srgbClr val="FFFF00"/>
-                </a:solidFill>
-                <a:latin typeface="微軟正黑體"/>
-              </a:defRPr>
-            </a:pPr>
-            <a:r>
-              <a:t>耶穌永遠掌權</a:t>
-            </a:r>
-          </a:p>
-        </p:txBody>
-      </p:sp>
-    </p:spTree>
-  </p:cSld>
-  <p:clrMapOvr>
-    <a:masterClrMapping/>
-  </p:clrMapOvr>
-</p:sld>
-</file>
-
-<file path=ppt/slides/slide22.xml><?xml version="1.0" encoding="utf-8"?>
-<p:sld xmlns:a="http://schemas.openxmlformats.org/drawingml/2006/main" xmlns:p="http://schemas.openxmlformats.org/presentationml/2006/main" xmlns:r="http://schemas.openxmlformats.org/officeDocument/2006/relationships">
-  <p:cSld>
-    <p:bg>
-      <p:bgPr>
-        <a:solidFill>
-          <a:srgbClr val="000000"/>
-        </a:solidFill>
-        <a:effectLst/>
-      </p:bgPr>
-    </p:bg>
-    <p:spTree>
-      <p:nvGrpSpPr>
-        <p:cNvPr id="1" name=""/>
-        <p:cNvGrpSpPr/>
-        <p:nvPr/>
-      </p:nvGrpSpPr>
-      <p:grpSpPr/>
-      <p:sp>
-        <p:nvSpPr>
-          <p:cNvPr id="2" name="TextBox 1"/>
-          <p:cNvSpPr txBox="1"/>
-          <p:nvPr/>
-        </p:nvSpPr>
-        <p:spPr>
-          <a:xfrm>
-            <a:off x="914400" y="91440"/>
-            <a:ext cx="12801600" cy="6858000"/>
-          </a:xfrm>
-          <a:prstGeom prst="rect">
-            <a:avLst/>
-          </a:prstGeom>
-          <a:noFill/>
-        </p:spPr>
-        <p:txBody>
-          <a:bodyPr wrap="square" anchor="t">
-            <a:spAutoFit/>
-          </a:bodyPr>
-          <a:lstStyle/>
-          <a:p>
-            <a:pPr algn="ctr">
-              <a:defRPr sz="4400" b="1">
-                <a:solidFill>
-                  <a:srgbClr val="FFFF00"/>
-                </a:solidFill>
-                <a:latin typeface="微軟正黑體"/>
-              </a:defRPr>
-            </a:pPr>
-            <a:r>
-              <a:t>2.當我的心動搖時 我仍要讚美耶穌</a:t>
-            </a:r>
-          </a:p>
-          <a:p>
-            <a:pPr algn="ctr">
-              <a:defRPr sz="4400" b="1">
-                <a:solidFill>
-                  <a:srgbClr val="FFFF00"/>
-                </a:solidFill>
-                <a:latin typeface="微軟正黑體"/>
-              </a:defRPr>
-            </a:pPr>
-            <a:r>
-              <a:t>祢是我的盼望 我心所依靠的</a:t>
-            </a:r>
-          </a:p>
-        </p:txBody>
-      </p:sp>
-      <p:sp>
-        <p:nvSpPr>
-          <p:cNvPr id="3" name="TextBox 2"/>
-          <p:cNvSpPr txBox="1"/>
-          <p:nvPr/>
-        </p:nvSpPr>
-        <p:spPr>
-          <a:xfrm>
-            <a:off x="914400" y="7543800"/>
-            <a:ext cx="12801600" cy="685800"/>
-          </a:xfrm>
-          <a:prstGeom prst="rect">
-            <a:avLst/>
-          </a:prstGeom>
-          <a:noFill/>
-        </p:spPr>
-        <p:txBody>
-          <a:bodyPr wrap="none">
-            <a:spAutoFit/>
-          </a:bodyPr>
-          <a:lstStyle/>
-          <a:p>
-            <a:pPr algn="ctr">
-              <a:defRPr sz="2400">
-                <a:solidFill>
-                  <a:srgbClr val="FFFF00"/>
-                </a:solidFill>
-                <a:latin typeface="微軟正黑體"/>
-              </a:defRPr>
-            </a:pPr>
-            <a:r>
-              <a:t>耶穌永遠掌權</a:t>
-            </a:r>
-          </a:p>
-        </p:txBody>
-      </p:sp>
-    </p:spTree>
-  </p:cSld>
-  <p:clrMapOvr>
-    <a:masterClrMapping/>
-  </p:clrMapOvr>
-</p:sld>
-</file>
-
-<file path=ppt/slides/slide23.xml><?xml version="1.0" encoding="utf-8"?>
-<p:sld xmlns:a="http://schemas.openxmlformats.org/drawingml/2006/main" xmlns:p="http://schemas.openxmlformats.org/presentationml/2006/main" xmlns:r="http://schemas.openxmlformats.org/officeDocument/2006/relationships">
-  <p:cSld>
-    <p:bg>
-      <p:bgPr>
-        <a:solidFill>
-          <a:srgbClr val="000000"/>
-        </a:solidFill>
-        <a:effectLst/>
-      </p:bgPr>
-    </p:bg>
-    <p:spTree>
-      <p:nvGrpSpPr>
-        <p:cNvPr id="1" name=""/>
-        <p:cNvGrpSpPr/>
-        <p:nvPr/>
-      </p:nvGrpSpPr>
-      <p:grpSpPr/>
-      <p:sp>
-        <p:nvSpPr>
-          <p:cNvPr id="2" name="TextBox 1"/>
-          <p:cNvSpPr txBox="1"/>
-          <p:nvPr/>
-        </p:nvSpPr>
-        <p:spPr>
-          <a:xfrm>
-            <a:off x="914400" y="91440"/>
-            <a:ext cx="12801600" cy="6858000"/>
-          </a:xfrm>
-          <a:prstGeom prst="rect">
-            <a:avLst/>
-          </a:prstGeom>
-          <a:noFill/>
-        </p:spPr>
-        <p:txBody>
-          <a:bodyPr wrap="square" anchor="t">
-            <a:spAutoFit/>
-          </a:bodyPr>
-          <a:lstStyle/>
-          <a:p>
-            <a:pPr algn="ctr">
-              <a:defRPr sz="4400" b="1">
-                <a:solidFill>
-                  <a:srgbClr val="FFFF00"/>
-                </a:solidFill>
-                <a:latin typeface="微軟正黑體"/>
-              </a:defRPr>
-            </a:pPr>
-            <a:r>
-              <a:t>※哈利路亞 哈利路亞 耶穌永遠掌權</a:t>
-            </a:r>
-          </a:p>
-          <a:p>
-            <a:pPr algn="ctr">
-              <a:defRPr sz="4400" b="1">
-                <a:solidFill>
-                  <a:srgbClr val="FFFF00"/>
-                </a:solidFill>
-                <a:latin typeface="微軟正黑體"/>
-              </a:defRPr>
-            </a:pPr>
-            <a:r>
-              <a:t>哈利路亞 哈利路亞 耶穌永遠掌權</a:t>
-            </a:r>
-          </a:p>
-        </p:txBody>
-      </p:sp>
-      <p:sp>
-        <p:nvSpPr>
-          <p:cNvPr id="3" name="TextBox 2"/>
-          <p:cNvSpPr txBox="1"/>
-          <p:nvPr/>
-        </p:nvSpPr>
-        <p:spPr>
-          <a:xfrm>
-            <a:off x="914400" y="7543800"/>
-            <a:ext cx="12801600" cy="685800"/>
-          </a:xfrm>
-          <a:prstGeom prst="rect">
-            <a:avLst/>
-          </a:prstGeom>
-          <a:noFill/>
-        </p:spPr>
-        <p:txBody>
-          <a:bodyPr wrap="none">
-            <a:spAutoFit/>
-          </a:bodyPr>
-          <a:lstStyle/>
-          <a:p>
-            <a:pPr algn="ctr">
-              <a:defRPr sz="2400">
-                <a:solidFill>
-                  <a:srgbClr val="FFFF00"/>
-                </a:solidFill>
-                <a:latin typeface="微軟正黑體"/>
-              </a:defRPr>
-            </a:pPr>
-            <a:r>
-              <a:t>耶穌永遠掌權</a:t>
-            </a:r>
-          </a:p>
-        </p:txBody>
-      </p:sp>
-    </p:spTree>
-  </p:cSld>
-  <p:clrMapOvr>
-    <a:masterClrMapping/>
-  </p:clrMapOvr>
-</p:sld>
-</file>
-
-<file path=ppt/slides/slide24.xml><?xml version="1.0" encoding="utf-8"?>
-<p:sld xmlns:a="http://schemas.openxmlformats.org/drawingml/2006/main" xmlns:p="http://schemas.openxmlformats.org/presentationml/2006/main" xmlns:r="http://schemas.openxmlformats.org/officeDocument/2006/relationships">
-  <p:cSld>
-    <p:bg>
-      <p:bgPr>
-        <a:solidFill>
-          <a:srgbClr val="000000"/>
-        </a:solidFill>
-        <a:effectLst/>
-      </p:bgPr>
-    </p:bg>
-    <p:spTree>
-      <p:nvGrpSpPr>
-        <p:cNvPr id="1" name=""/>
-        <p:cNvGrpSpPr/>
-        <p:nvPr/>
-      </p:nvGrpSpPr>
-      <p:grpSpPr/>
-      <p:sp>
-        <p:nvSpPr>
-          <p:cNvPr id="2" name="TextBox 1"/>
-          <p:cNvSpPr txBox="1"/>
-          <p:nvPr/>
-        </p:nvSpPr>
-        <p:spPr>
-          <a:xfrm>
-            <a:off x="914400" y="91440"/>
-            <a:ext cx="12801600" cy="6858000"/>
-          </a:xfrm>
-          <a:prstGeom prst="rect">
-            <a:avLst/>
-          </a:prstGeom>
-          <a:noFill/>
-        </p:spPr>
-        <p:txBody>
-          <a:bodyPr wrap="square" anchor="t">
-            <a:spAutoFit/>
-          </a:bodyPr>
-          <a:lstStyle/>
-          <a:p>
-            <a:pPr algn="ctr">
-              <a:defRPr sz="4400" b="1">
-                <a:solidFill>
-                  <a:srgbClr val="FFFF00"/>
-                </a:solidFill>
-                <a:latin typeface="微軟正黑體"/>
-              </a:defRPr>
-            </a:pPr>
-            <a:r>
-              <a:t>§白晝 祢向我施慈愛 黑夜 我要歌頌禱告</a:t>
-            </a:r>
-          </a:p>
-          <a:p>
-            <a:pPr algn="ctr">
-              <a:defRPr sz="4400" b="1">
-                <a:solidFill>
-                  <a:srgbClr val="FFFF00"/>
-                </a:solidFill>
-                <a:latin typeface="微軟正黑體"/>
-              </a:defRPr>
-            </a:pPr>
-            <a:r>
-              <a:t>祢是我的詩歌 我的避難所 叫我抬起頭的神</a:t>
-            </a:r>
-          </a:p>
-        </p:txBody>
-      </p:sp>
-      <p:sp>
-        <p:nvSpPr>
-          <p:cNvPr id="3" name="TextBox 2"/>
-          <p:cNvSpPr txBox="1"/>
-          <p:nvPr/>
-        </p:nvSpPr>
-        <p:spPr>
-          <a:xfrm>
-            <a:off x="914400" y="7543800"/>
-            <a:ext cx="12801600" cy="685800"/>
-          </a:xfrm>
-          <a:prstGeom prst="rect">
-            <a:avLst/>
-          </a:prstGeom>
-          <a:noFill/>
-        </p:spPr>
-        <p:txBody>
-          <a:bodyPr wrap="none">
-            <a:spAutoFit/>
-          </a:bodyPr>
-          <a:lstStyle/>
-          <a:p>
-            <a:pPr algn="ctr">
-              <a:defRPr sz="2400">
-                <a:solidFill>
-                  <a:srgbClr val="FFFF00"/>
-                </a:solidFill>
-                <a:latin typeface="微軟正黑體"/>
-              </a:defRPr>
-            </a:pPr>
-            <a:r>
-              <a:t>耶穌永遠掌權</a:t>
-            </a:r>
-          </a:p>
-        </p:txBody>
-      </p:sp>
-    </p:spTree>
-  </p:cSld>
-  <p:clrMapOvr>
-    <a:masterClrMapping/>
-  </p:clrMapOvr>
-</p:sld>
-</file>
-
-<file path=ppt/slides/slide25.xml><?xml version="1.0" encoding="utf-8"?>
-<p:sld xmlns:a="http://schemas.openxmlformats.org/drawingml/2006/main" xmlns:p="http://schemas.openxmlformats.org/presentationml/2006/main" xmlns:r="http://schemas.openxmlformats.org/officeDocument/2006/relationships">
-  <p:cSld>
-    <p:bg>
-      <p:bgPr>
-        <a:solidFill>
-          <a:srgbClr val="000000"/>
-        </a:solidFill>
-        <a:effectLst/>
-      </p:bgPr>
-    </p:bg>
-    <p:spTree>
-      <p:nvGrpSpPr>
-        <p:cNvPr id="1" name=""/>
-        <p:cNvGrpSpPr/>
-        <p:nvPr/>
-      </p:nvGrpSpPr>
-      <p:grpSpPr/>
-      <p:sp>
-        <p:nvSpPr>
-          <p:cNvPr id="2" name="TextBox 1"/>
-          <p:cNvSpPr txBox="1"/>
-          <p:nvPr/>
-        </p:nvSpPr>
-        <p:spPr>
-          <a:xfrm>
-            <a:off x="914400" y="91440"/>
-            <a:ext cx="12801600" cy="6858000"/>
-          </a:xfrm>
-          <a:prstGeom prst="rect">
-            <a:avLst/>
-          </a:prstGeom>
-          <a:noFill/>
-        </p:spPr>
-        <p:txBody>
-          <a:bodyPr wrap="square" anchor="t">
-            <a:spAutoFit/>
-          </a:bodyPr>
-          <a:lstStyle/>
-          <a:p>
-            <a:pPr algn="ctr">
-              <a:defRPr sz="4400" b="1">
-                <a:solidFill>
-                  <a:srgbClr val="FFFF00"/>
-                </a:solidFill>
-                <a:latin typeface="微軟正黑體"/>
-              </a:defRPr>
-            </a:pPr>
-            <a:r>
-              <a:t>1.獻上感恩的心 歸給至聖全能神</a:t>
-            </a:r>
-          </a:p>
-          <a:p>
-            <a:pPr algn="ctr">
-              <a:defRPr sz="4400" b="1">
-                <a:solidFill>
-                  <a:srgbClr val="FFFF00"/>
-                </a:solidFill>
-                <a:latin typeface="微軟正黑體"/>
-              </a:defRPr>
-            </a:pPr>
-            <a:r>
-              <a:t>因他賜下獨生子 主耶穌基督</a:t>
-            </a:r>
-          </a:p>
-        </p:txBody>
-      </p:sp>
-      <p:sp>
-        <p:nvSpPr>
-          <p:cNvPr id="3" name="TextBox 2"/>
-          <p:cNvSpPr txBox="1"/>
-          <p:nvPr/>
-        </p:nvSpPr>
-        <p:spPr>
-          <a:xfrm>
-            <a:off x="914400" y="7543800"/>
-            <a:ext cx="12801600" cy="685800"/>
-          </a:xfrm>
-          <a:prstGeom prst="rect">
-            <a:avLst/>
-          </a:prstGeom>
-          <a:noFill/>
-        </p:spPr>
-        <p:txBody>
-          <a:bodyPr wrap="none">
-            <a:spAutoFit/>
-          </a:bodyPr>
-          <a:lstStyle/>
-          <a:p>
-            <a:pPr algn="ctr">
-              <a:defRPr sz="2400">
-                <a:solidFill>
-                  <a:srgbClr val="FFFF00"/>
-                </a:solidFill>
-                <a:latin typeface="微軟正黑體"/>
-              </a:defRPr>
-            </a:pPr>
-            <a:r>
-              <a:t>獻上感恩的心</a:t>
-            </a:r>
-          </a:p>
-        </p:txBody>
-      </p:sp>
-    </p:spTree>
-  </p:cSld>
-  <p:clrMapOvr>
-    <a:masterClrMapping/>
-  </p:clrMapOvr>
-</p:sld>
-</file>
-
-<file path=ppt/slides/slide26.xml><?xml version="1.0" encoding="utf-8"?>
-<p:sld xmlns:a="http://schemas.openxmlformats.org/drawingml/2006/main" xmlns:p="http://schemas.openxmlformats.org/presentationml/2006/main" xmlns:r="http://schemas.openxmlformats.org/officeDocument/2006/relationships">
-  <p:cSld>
-    <p:bg>
-      <p:bgPr>
-        <a:solidFill>
-          <a:srgbClr val="000000"/>
-        </a:solidFill>
-        <a:effectLst/>
-      </p:bgPr>
-    </p:bg>
-    <p:spTree>
-      <p:nvGrpSpPr>
-        <p:cNvPr id="1" name=""/>
-        <p:cNvGrpSpPr/>
-        <p:nvPr/>
-      </p:nvGrpSpPr>
-      <p:grpSpPr/>
-      <p:sp>
-        <p:nvSpPr>
-          <p:cNvPr id="2" name="TextBox 1"/>
-          <p:cNvSpPr txBox="1"/>
-          <p:nvPr/>
-        </p:nvSpPr>
-        <p:spPr>
-          <a:xfrm>
-            <a:off x="914400" y="91440"/>
-            <a:ext cx="12801600" cy="6858000"/>
-          </a:xfrm>
-          <a:prstGeom prst="rect">
-            <a:avLst/>
-          </a:prstGeom>
-          <a:noFill/>
-        </p:spPr>
-        <p:txBody>
-          <a:bodyPr wrap="square" anchor="t">
-            <a:spAutoFit/>
-          </a:bodyPr>
-          <a:lstStyle/>
-          <a:p>
-            <a:pPr algn="ctr">
-              <a:defRPr sz="4400" b="1">
-                <a:solidFill>
-                  <a:srgbClr val="FFFF00"/>
-                </a:solidFill>
-                <a:latin typeface="微軟正黑體"/>
-              </a:defRPr>
-            </a:pPr>
-            <a:r>
-              <a:t>c.如今軟弱者已得剛強 貧窮者已成富足</a:t>
-            </a:r>
-          </a:p>
-          <a:p>
-            <a:pPr algn="ctr">
-              <a:defRPr sz="4400" b="1">
-                <a:solidFill>
-                  <a:srgbClr val="FFFF00"/>
-                </a:solidFill>
-                <a:latin typeface="微軟正黑體"/>
-              </a:defRPr>
-            </a:pPr>
-            <a:r>
-              <a:t>都因為主已成就了大事 (感恩 感恩)</a:t>
-            </a:r>
-          </a:p>
-        </p:txBody>
-      </p:sp>
-      <p:sp>
-        <p:nvSpPr>
-          <p:cNvPr id="3" name="TextBox 2"/>
-          <p:cNvSpPr txBox="1"/>
-          <p:nvPr/>
-        </p:nvSpPr>
-        <p:spPr>
-          <a:xfrm>
-            <a:off x="914400" y="7543800"/>
-            <a:ext cx="12801600" cy="685800"/>
-          </a:xfrm>
-          <a:prstGeom prst="rect">
-            <a:avLst/>
-          </a:prstGeom>
-          <a:noFill/>
-        </p:spPr>
-        <p:txBody>
-          <a:bodyPr wrap="none">
-            <a:spAutoFit/>
-          </a:bodyPr>
-          <a:lstStyle/>
-          <a:p>
-            <a:pPr algn="ctr">
-              <a:defRPr sz="2400">
-                <a:solidFill>
-                  <a:srgbClr val="FFFF00"/>
-                </a:solidFill>
-                <a:latin typeface="微軟正黑體"/>
-              </a:defRPr>
-            </a:pPr>
-            <a:r>
-              <a:t>獻上感恩的心</a:t>
+              </a:rPr>
+              <a:t>《讚美之泉》</a:t>
             </a:r>
           </a:p>
         </p:txBody>
@@ -5238,8 +3318,8 @@
         </p:nvSpPr>
         <p:spPr>
           <a:xfrm>
-            <a:off x="914400" y="91440"/>
-            <a:ext cx="12801600" cy="6858000"/>
+            <a:off x="457200" y="91440"/>
+            <a:ext cx="8229600" cy="2286000"/>
           </a:xfrm>
           <a:prstGeom prst="rect">
             <a:avLst/>
@@ -5247,34 +3327,30 @@
           <a:noFill/>
         </p:spPr>
         <p:txBody>
-          <a:bodyPr wrap="square" anchor="t">
+          <a:bodyPr wrap="none">
             <a:spAutoFit/>
           </a:bodyPr>
           <a:lstStyle/>
           <a:p>
-            <a:pPr algn="ctr">
-              <a:defRPr sz="4400" b="1">
+            <a:pPr algn="ctr"/>
+            <a:r>
+              <a:rPr sz="3200" b="1">
                 <a:solidFill>
                   <a:srgbClr val="FFFF00"/>
                 </a:solidFill>
                 <a:latin typeface="微軟正黑體"/>
-              </a:defRPr>
-            </a:pPr>
-            <a:r>
-              <a:t>2.我們相聚 愛裡敬拜</a:t>
-            </a:r>
-          </a:p>
-          <a:p>
-            <a:pPr algn="ctr">
-              <a:defRPr sz="4400" b="1">
+              </a:rPr>
+              <a:t>耶穌我愛你 俯伏在你面前 讚美敬拜你 主～我王</a:t>
+            </a:r>
+            <a:br/>
+            <a:r>
+              <a:rPr sz="3200" b="1">
                 <a:solidFill>
                   <a:srgbClr val="FFFF00"/>
                 </a:solidFill>
                 <a:latin typeface="微軟正黑體"/>
-              </a:defRPr>
-            </a:pPr>
-            <a:r>
-              <a:t>願耶穌的愛充滿在這裡</a:t>
+              </a:rPr>
+              <a:t>哈利路亞 哈利路亞 哈利路亞 哈利路 </a:t>
             </a:r>
           </a:p>
         </p:txBody>
@@ -5287,8 +3363,8 @@
         </p:nvSpPr>
         <p:spPr>
           <a:xfrm>
-            <a:off x="914400" y="7543800"/>
-            <a:ext cx="12801600" cy="685800"/>
+            <a:off x="457200" y="4663440"/>
+            <a:ext cx="8229600" cy="457200"/>
           </a:xfrm>
           <a:prstGeom prst="rect">
             <a:avLst/>
@@ -5301,682 +3377,15 @@
           </a:bodyPr>
           <a:lstStyle/>
           <a:p>
-            <a:pPr algn="ctr">
-              <a:defRPr sz="2400">
+            <a:pPr algn="ctr"/>
+            <a:r>
+              <a:rPr sz="2000" b="0">
                 <a:solidFill>
                   <a:srgbClr val="FFFF00"/>
                 </a:solidFill>
                 <a:latin typeface="微軟正黑體"/>
-              </a:defRPr>
-            </a:pPr>
-            <a:r>
-              <a:t>來歡呼來讚美</a:t>
-            </a:r>
-          </a:p>
-        </p:txBody>
-      </p:sp>
-    </p:spTree>
-  </p:cSld>
-  <p:clrMapOvr>
-    <a:masterClrMapping/>
-  </p:clrMapOvr>
-</p:sld>
-</file>
-
-<file path=ppt/slides/slide4.xml><?xml version="1.0" encoding="utf-8"?>
-<p:sld xmlns:a="http://schemas.openxmlformats.org/drawingml/2006/main" xmlns:p="http://schemas.openxmlformats.org/presentationml/2006/main" xmlns:r="http://schemas.openxmlformats.org/officeDocument/2006/relationships">
-  <p:cSld>
-    <p:bg>
-      <p:bgPr>
-        <a:solidFill>
-          <a:srgbClr val="000000"/>
-        </a:solidFill>
-        <a:effectLst/>
-      </p:bgPr>
-    </p:bg>
-    <p:spTree>
-      <p:nvGrpSpPr>
-        <p:cNvPr id="1" name=""/>
-        <p:cNvGrpSpPr/>
-        <p:nvPr/>
-      </p:nvGrpSpPr>
-      <p:grpSpPr/>
-      <p:sp>
-        <p:nvSpPr>
-          <p:cNvPr id="2" name="TextBox 1"/>
-          <p:cNvSpPr txBox="1"/>
-          <p:nvPr/>
-        </p:nvSpPr>
-        <p:spPr>
-          <a:xfrm>
-            <a:off x="914400" y="91440"/>
-            <a:ext cx="12801600" cy="6858000"/>
-          </a:xfrm>
-          <a:prstGeom prst="rect">
-            <a:avLst/>
-          </a:prstGeom>
-          <a:noFill/>
-        </p:spPr>
-        <p:txBody>
-          <a:bodyPr wrap="square" anchor="t">
-            <a:spAutoFit/>
-          </a:bodyPr>
-          <a:lstStyle/>
-          <a:p>
-            <a:pPr algn="ctr">
-              <a:defRPr sz="4400" b="1">
-                <a:solidFill>
-                  <a:srgbClr val="FFFF00"/>
-                </a:solidFill>
-                <a:latin typeface="微軟正黑體"/>
-              </a:defRPr>
-            </a:pPr>
-            <a:r>
-              <a:t>高舉雙手 大聲宣告</a:t>
-            </a:r>
-          </a:p>
-          <a:p>
-            <a:pPr algn="ctr">
-              <a:defRPr sz="4400" b="1">
-                <a:solidFill>
-                  <a:srgbClr val="FFFF00"/>
-                </a:solidFill>
-                <a:latin typeface="微軟正黑體"/>
-              </a:defRPr>
-            </a:pPr>
-            <a:r>
-              <a:t>願神的喜樂成為我力量</a:t>
-            </a:r>
-          </a:p>
-        </p:txBody>
-      </p:sp>
-      <p:sp>
-        <p:nvSpPr>
-          <p:cNvPr id="3" name="TextBox 2"/>
-          <p:cNvSpPr txBox="1"/>
-          <p:nvPr/>
-        </p:nvSpPr>
-        <p:spPr>
-          <a:xfrm>
-            <a:off x="914400" y="7543800"/>
-            <a:ext cx="12801600" cy="685800"/>
-          </a:xfrm>
-          <a:prstGeom prst="rect">
-            <a:avLst/>
-          </a:prstGeom>
-          <a:noFill/>
-        </p:spPr>
-        <p:txBody>
-          <a:bodyPr wrap="none">
-            <a:spAutoFit/>
-          </a:bodyPr>
-          <a:lstStyle/>
-          <a:p>
-            <a:pPr algn="ctr">
-              <a:defRPr sz="2400">
-                <a:solidFill>
-                  <a:srgbClr val="FFFF00"/>
-                </a:solidFill>
-                <a:latin typeface="微軟正黑體"/>
-              </a:defRPr>
-            </a:pPr>
-            <a:r>
-              <a:t>來歡呼來讚美</a:t>
-            </a:r>
-          </a:p>
-        </p:txBody>
-      </p:sp>
-    </p:spTree>
-  </p:cSld>
-  <p:clrMapOvr>
-    <a:masterClrMapping/>
-  </p:clrMapOvr>
-</p:sld>
-</file>
-
-<file path=ppt/slides/slide5.xml><?xml version="1.0" encoding="utf-8"?>
-<p:sld xmlns:a="http://schemas.openxmlformats.org/drawingml/2006/main" xmlns:p="http://schemas.openxmlformats.org/presentationml/2006/main" xmlns:r="http://schemas.openxmlformats.org/officeDocument/2006/relationships">
-  <p:cSld>
-    <p:bg>
-      <p:bgPr>
-        <a:solidFill>
-          <a:srgbClr val="000000"/>
-        </a:solidFill>
-        <a:effectLst/>
-      </p:bgPr>
-    </p:bg>
-    <p:spTree>
-      <p:nvGrpSpPr>
-        <p:cNvPr id="1" name=""/>
-        <p:cNvGrpSpPr/>
-        <p:nvPr/>
-      </p:nvGrpSpPr>
-      <p:grpSpPr/>
-      <p:sp>
-        <p:nvSpPr>
-          <p:cNvPr id="2" name="TextBox 1"/>
-          <p:cNvSpPr txBox="1"/>
-          <p:nvPr/>
-        </p:nvSpPr>
-        <p:spPr>
-          <a:xfrm>
-            <a:off x="914400" y="91440"/>
-            <a:ext cx="12801600" cy="6858000"/>
-          </a:xfrm>
-          <a:prstGeom prst="rect">
-            <a:avLst/>
-          </a:prstGeom>
-          <a:noFill/>
-        </p:spPr>
-        <p:txBody>
-          <a:bodyPr wrap="square" anchor="t">
-            <a:spAutoFit/>
-          </a:bodyPr>
-          <a:lstStyle/>
-          <a:p>
-            <a:pPr algn="ctr">
-              <a:defRPr sz="4400" b="1">
-                <a:solidFill>
-                  <a:srgbClr val="FFFF00"/>
-                </a:solidFill>
-                <a:latin typeface="微軟正黑體"/>
-              </a:defRPr>
-            </a:pPr>
-            <a:r>
-              <a:t>※來歡呼來讚美 將榮耀都歸於祂</a:t>
-            </a:r>
-          </a:p>
-          <a:p>
-            <a:pPr algn="ctr">
-              <a:defRPr sz="4400" b="1">
-                <a:solidFill>
-                  <a:srgbClr val="FFFF00"/>
-                </a:solidFill>
-                <a:latin typeface="微軟正黑體"/>
-              </a:defRPr>
-            </a:pPr>
-            <a:r>
-              <a:t>來歡呼來讚美 來向耶和華歌唱</a:t>
-            </a:r>
-          </a:p>
-        </p:txBody>
-      </p:sp>
-      <p:sp>
-        <p:nvSpPr>
-          <p:cNvPr id="3" name="TextBox 2"/>
-          <p:cNvSpPr txBox="1"/>
-          <p:nvPr/>
-        </p:nvSpPr>
-        <p:spPr>
-          <a:xfrm>
-            <a:off x="914400" y="7543800"/>
-            <a:ext cx="12801600" cy="685800"/>
-          </a:xfrm>
-          <a:prstGeom prst="rect">
-            <a:avLst/>
-          </a:prstGeom>
-          <a:noFill/>
-        </p:spPr>
-        <p:txBody>
-          <a:bodyPr wrap="none">
-            <a:spAutoFit/>
-          </a:bodyPr>
-          <a:lstStyle/>
-          <a:p>
-            <a:pPr algn="ctr">
-              <a:defRPr sz="2400">
-                <a:solidFill>
-                  <a:srgbClr val="FFFF00"/>
-                </a:solidFill>
-                <a:latin typeface="微軟正黑體"/>
-              </a:defRPr>
-            </a:pPr>
-            <a:r>
-              <a:t>來歡呼來讚美</a:t>
-            </a:r>
-          </a:p>
-        </p:txBody>
-      </p:sp>
-    </p:spTree>
-  </p:cSld>
-  <p:clrMapOvr>
-    <a:masterClrMapping/>
-  </p:clrMapOvr>
-</p:sld>
-</file>
-
-<file path=ppt/slides/slide6.xml><?xml version="1.0" encoding="utf-8"?>
-<p:sld xmlns:a="http://schemas.openxmlformats.org/drawingml/2006/main" xmlns:p="http://schemas.openxmlformats.org/presentationml/2006/main" xmlns:r="http://schemas.openxmlformats.org/officeDocument/2006/relationships">
-  <p:cSld>
-    <p:bg>
-      <p:bgPr>
-        <a:solidFill>
-          <a:srgbClr val="000000"/>
-        </a:solidFill>
-        <a:effectLst/>
-      </p:bgPr>
-    </p:bg>
-    <p:spTree>
-      <p:nvGrpSpPr>
-        <p:cNvPr id="1" name=""/>
-        <p:cNvGrpSpPr/>
-        <p:nvPr/>
-      </p:nvGrpSpPr>
-      <p:grpSpPr/>
-      <p:sp>
-        <p:nvSpPr>
-          <p:cNvPr id="2" name="TextBox 1"/>
-          <p:cNvSpPr txBox="1"/>
-          <p:nvPr/>
-        </p:nvSpPr>
-        <p:spPr>
-          <a:xfrm>
-            <a:off x="914400" y="91440"/>
-            <a:ext cx="12801600" cy="6858000"/>
-          </a:xfrm>
-          <a:prstGeom prst="rect">
-            <a:avLst/>
-          </a:prstGeom>
-          <a:noFill/>
-        </p:spPr>
-        <p:txBody>
-          <a:bodyPr wrap="square" anchor="t">
-            <a:spAutoFit/>
-          </a:bodyPr>
-          <a:lstStyle/>
-          <a:p>
-            <a:pPr algn="ctr">
-              <a:defRPr sz="4400" b="1">
-                <a:solidFill>
-                  <a:srgbClr val="FFFF00"/>
-                </a:solidFill>
-                <a:latin typeface="微軟正黑體"/>
-              </a:defRPr>
-            </a:pPr>
-            <a:r>
-              <a:t>來歡呼來讚美 將榮耀都歸於祂</a:t>
-            </a:r>
-          </a:p>
-          <a:p>
-            <a:pPr algn="ctr">
-              <a:defRPr sz="4400" b="1">
-                <a:solidFill>
-                  <a:srgbClr val="FFFF00"/>
-                </a:solidFill>
-                <a:latin typeface="微軟正黑體"/>
-              </a:defRPr>
-            </a:pPr>
-            <a:r>
-              <a:t>來歡呼來讚美 來向耶和華歌唱</a:t>
-            </a:r>
-          </a:p>
-        </p:txBody>
-      </p:sp>
-      <p:sp>
-        <p:nvSpPr>
-          <p:cNvPr id="3" name="TextBox 2"/>
-          <p:cNvSpPr txBox="1"/>
-          <p:nvPr/>
-        </p:nvSpPr>
-        <p:spPr>
-          <a:xfrm>
-            <a:off x="914400" y="7543800"/>
-            <a:ext cx="12801600" cy="685800"/>
-          </a:xfrm>
-          <a:prstGeom prst="rect">
-            <a:avLst/>
-          </a:prstGeom>
-          <a:noFill/>
-        </p:spPr>
-        <p:txBody>
-          <a:bodyPr wrap="none">
-            <a:spAutoFit/>
-          </a:bodyPr>
-          <a:lstStyle/>
-          <a:p>
-            <a:pPr algn="ctr">
-              <a:defRPr sz="2400">
-                <a:solidFill>
-                  <a:srgbClr val="FFFF00"/>
-                </a:solidFill>
-                <a:latin typeface="微軟正黑體"/>
-              </a:defRPr>
-            </a:pPr>
-            <a:r>
-              <a:t>來歡呼來讚美</a:t>
-            </a:r>
-          </a:p>
-        </p:txBody>
-      </p:sp>
-    </p:spTree>
-  </p:cSld>
-  <p:clrMapOvr>
-    <a:masterClrMapping/>
-  </p:clrMapOvr>
-</p:sld>
-</file>
-
-<file path=ppt/slides/slide7.xml><?xml version="1.0" encoding="utf-8"?>
-<p:sld xmlns:a="http://schemas.openxmlformats.org/drawingml/2006/main" xmlns:p="http://schemas.openxmlformats.org/presentationml/2006/main" xmlns:r="http://schemas.openxmlformats.org/officeDocument/2006/relationships">
-  <p:cSld>
-    <p:bg>
-      <p:bgPr>
-        <a:solidFill>
-          <a:srgbClr val="000000"/>
-        </a:solidFill>
-        <a:effectLst/>
-      </p:bgPr>
-    </p:bg>
-    <p:spTree>
-      <p:nvGrpSpPr>
-        <p:cNvPr id="1" name=""/>
-        <p:cNvGrpSpPr/>
-        <p:nvPr/>
-      </p:nvGrpSpPr>
-      <p:grpSpPr/>
-      <p:sp>
-        <p:nvSpPr>
-          <p:cNvPr id="2" name="TextBox 1"/>
-          <p:cNvSpPr txBox="1"/>
-          <p:nvPr/>
-        </p:nvSpPr>
-        <p:spPr>
-          <a:xfrm>
-            <a:off x="914400" y="91440"/>
-            <a:ext cx="12801600" cy="6858000"/>
-          </a:xfrm>
-          <a:prstGeom prst="rect">
-            <a:avLst/>
-          </a:prstGeom>
-          <a:noFill/>
-        </p:spPr>
-        <p:txBody>
-          <a:bodyPr wrap="square" anchor="t">
-            <a:spAutoFit/>
-          </a:bodyPr>
-          <a:lstStyle/>
-          <a:p>
-            <a:pPr algn="ctr">
-              <a:defRPr sz="4400" b="1">
-                <a:solidFill>
-                  <a:srgbClr val="FFFF00"/>
-                </a:solidFill>
-                <a:latin typeface="微軟正黑體"/>
-              </a:defRPr>
-            </a:pPr>
-            <a:r>
-              <a:t>§ woah oh oh woah X3</a:t>
-            </a:r>
-          </a:p>
-          <a:p>
-            <a:pPr algn="ctr">
-              <a:defRPr sz="4400" b="1">
-                <a:solidFill>
-                  <a:srgbClr val="FFFF00"/>
-                </a:solidFill>
-                <a:latin typeface="微軟正黑體"/>
-              </a:defRPr>
-            </a:pPr>
-            <a:r>
-              <a:t>woah oh oh o</a:t>
-            </a:r>
-          </a:p>
-        </p:txBody>
-      </p:sp>
-      <p:sp>
-        <p:nvSpPr>
-          <p:cNvPr id="3" name="TextBox 2"/>
-          <p:cNvSpPr txBox="1"/>
-          <p:nvPr/>
-        </p:nvSpPr>
-        <p:spPr>
-          <a:xfrm>
-            <a:off x="914400" y="7543800"/>
-            <a:ext cx="12801600" cy="685800"/>
-          </a:xfrm>
-          <a:prstGeom prst="rect">
-            <a:avLst/>
-          </a:prstGeom>
-          <a:noFill/>
-        </p:spPr>
-        <p:txBody>
-          <a:bodyPr wrap="none">
-            <a:spAutoFit/>
-          </a:bodyPr>
-          <a:lstStyle/>
-          <a:p>
-            <a:pPr algn="ctr">
-              <a:defRPr sz="2400">
-                <a:solidFill>
-                  <a:srgbClr val="FFFF00"/>
-                </a:solidFill>
-                <a:latin typeface="微軟正黑體"/>
-              </a:defRPr>
-            </a:pPr>
-            <a:r>
-              <a:t>來歡呼來讚美</a:t>
-            </a:r>
-          </a:p>
-        </p:txBody>
-      </p:sp>
-    </p:spTree>
-  </p:cSld>
-  <p:clrMapOvr>
-    <a:masterClrMapping/>
-  </p:clrMapOvr>
-</p:sld>
-</file>
-
-<file path=ppt/slides/slide8.xml><?xml version="1.0" encoding="utf-8"?>
-<p:sld xmlns:a="http://schemas.openxmlformats.org/drawingml/2006/main" xmlns:p="http://schemas.openxmlformats.org/presentationml/2006/main" xmlns:r="http://schemas.openxmlformats.org/officeDocument/2006/relationships">
-  <p:cSld>
-    <p:bg>
-      <p:bgPr>
-        <a:solidFill>
-          <a:srgbClr val="000000"/>
-        </a:solidFill>
-        <a:effectLst/>
-      </p:bgPr>
-    </p:bg>
-    <p:spTree>
-      <p:nvGrpSpPr>
-        <p:cNvPr id="1" name=""/>
-        <p:cNvGrpSpPr/>
-        <p:nvPr/>
-      </p:nvGrpSpPr>
-      <p:grpSpPr/>
-      <p:sp>
-        <p:nvSpPr>
-          <p:cNvPr id="2" name="TextBox 1"/>
-          <p:cNvSpPr txBox="1"/>
-          <p:nvPr/>
-        </p:nvSpPr>
-        <p:spPr>
-          <a:xfrm>
-            <a:off x="914400" y="91440"/>
-            <a:ext cx="12801600" cy="6858000"/>
-          </a:xfrm>
-          <a:prstGeom prst="rect">
-            <a:avLst/>
-          </a:prstGeom>
-          <a:noFill/>
-        </p:spPr>
-        <p:txBody>
-          <a:bodyPr wrap="square" anchor="t">
-            <a:spAutoFit/>
-          </a:bodyPr>
-          <a:lstStyle/>
-          <a:p>
-            <a:pPr algn="ctr">
-              <a:defRPr sz="4400" b="1">
-                <a:solidFill>
-                  <a:srgbClr val="FFFF00"/>
-                </a:solidFill>
-                <a:latin typeface="微軟正黑體"/>
-              </a:defRPr>
-            </a:pPr>
-            <a:r>
-              <a:t>將天敞開 祢的榮耀降下來</a:t>
-            </a:r>
-          </a:p>
-          <a:p>
-            <a:pPr algn="ctr">
-              <a:defRPr sz="4400" b="1">
-                <a:solidFill>
-                  <a:srgbClr val="FFFF00"/>
-                </a:solidFill>
-                <a:latin typeface="微軟正黑體"/>
-              </a:defRPr>
-            </a:pPr>
-            <a:r>
-              <a:t>將天敞開 祢的同在降下來</a:t>
-            </a:r>
-          </a:p>
-        </p:txBody>
-      </p:sp>
-      <p:sp>
-        <p:nvSpPr>
-          <p:cNvPr id="3" name="TextBox 2"/>
-          <p:cNvSpPr txBox="1"/>
-          <p:nvPr/>
-        </p:nvSpPr>
-        <p:spPr>
-          <a:xfrm>
-            <a:off x="914400" y="7543800"/>
-            <a:ext cx="12801600" cy="685800"/>
-          </a:xfrm>
-          <a:prstGeom prst="rect">
-            <a:avLst/>
-          </a:prstGeom>
-          <a:noFill/>
-        </p:spPr>
-        <p:txBody>
-          <a:bodyPr wrap="none">
-            <a:spAutoFit/>
-          </a:bodyPr>
-          <a:lstStyle/>
-          <a:p>
-            <a:pPr algn="ctr">
-              <a:defRPr sz="2400">
-                <a:solidFill>
-                  <a:srgbClr val="FFFF00"/>
-                </a:solidFill>
-                <a:latin typeface="微軟正黑體"/>
-              </a:defRPr>
-            </a:pPr>
-            <a:r>
-              <a:t>將天敞開</a:t>
-            </a:r>
-          </a:p>
-        </p:txBody>
-      </p:sp>
-    </p:spTree>
-  </p:cSld>
-  <p:clrMapOvr>
-    <a:masterClrMapping/>
-  </p:clrMapOvr>
-</p:sld>
-</file>
-
-<file path=ppt/slides/slide9.xml><?xml version="1.0" encoding="utf-8"?>
-<p:sld xmlns:a="http://schemas.openxmlformats.org/drawingml/2006/main" xmlns:p="http://schemas.openxmlformats.org/presentationml/2006/main" xmlns:r="http://schemas.openxmlformats.org/officeDocument/2006/relationships">
-  <p:cSld>
-    <p:bg>
-      <p:bgPr>
-        <a:solidFill>
-          <a:srgbClr val="000000"/>
-        </a:solidFill>
-        <a:effectLst/>
-      </p:bgPr>
-    </p:bg>
-    <p:spTree>
-      <p:nvGrpSpPr>
-        <p:cNvPr id="1" name=""/>
-        <p:cNvGrpSpPr/>
-        <p:nvPr/>
-      </p:nvGrpSpPr>
-      <p:grpSpPr/>
-      <p:sp>
-        <p:nvSpPr>
-          <p:cNvPr id="2" name="TextBox 1"/>
-          <p:cNvSpPr txBox="1"/>
-          <p:nvPr/>
-        </p:nvSpPr>
-        <p:spPr>
-          <a:xfrm>
-            <a:off x="914400" y="91440"/>
-            <a:ext cx="12801600" cy="6858000"/>
-          </a:xfrm>
-          <a:prstGeom prst="rect">
-            <a:avLst/>
-          </a:prstGeom>
-          <a:noFill/>
-        </p:spPr>
-        <p:txBody>
-          <a:bodyPr wrap="square" anchor="t">
-            <a:spAutoFit/>
-          </a:bodyPr>
-          <a:lstStyle/>
-          <a:p>
-            <a:pPr algn="ctr">
-              <a:defRPr sz="4400" b="1">
-                <a:solidFill>
-                  <a:srgbClr val="FFFF00"/>
-                </a:solidFill>
-                <a:latin typeface="微軟正黑體"/>
-              </a:defRPr>
-            </a:pPr>
-            <a:r>
-              <a:t>將天敞開 祢的榮耀降下來</a:t>
-            </a:r>
-          </a:p>
-          <a:p>
-            <a:pPr algn="ctr">
-              <a:defRPr sz="4400" b="1">
-                <a:solidFill>
-                  <a:srgbClr val="FFFF00"/>
-                </a:solidFill>
-                <a:latin typeface="微軟正黑體"/>
-              </a:defRPr>
-            </a:pPr>
-            <a:r>
-              <a:t>萬國讚嘆祢 祢是榮耀君王</a:t>
-            </a:r>
-          </a:p>
-        </p:txBody>
-      </p:sp>
-      <p:sp>
-        <p:nvSpPr>
-          <p:cNvPr id="3" name="TextBox 2"/>
-          <p:cNvSpPr txBox="1"/>
-          <p:nvPr/>
-        </p:nvSpPr>
-        <p:spPr>
-          <a:xfrm>
-            <a:off x="914400" y="7543800"/>
-            <a:ext cx="12801600" cy="685800"/>
-          </a:xfrm>
-          <a:prstGeom prst="rect">
-            <a:avLst/>
-          </a:prstGeom>
-          <a:noFill/>
-        </p:spPr>
-        <p:txBody>
-          <a:bodyPr wrap="none">
-            <a:spAutoFit/>
-          </a:bodyPr>
-          <a:lstStyle/>
-          <a:p>
-            <a:pPr algn="ctr">
-              <a:defRPr sz="2400">
-                <a:solidFill>
-                  <a:srgbClr val="FFFF00"/>
-                </a:solidFill>
-                <a:latin typeface="微軟正黑體"/>
-              </a:defRPr>
-            </a:pPr>
-            <a:r>
-              <a:t>將天敞開</a:t>
+              </a:rPr>
+              <a:t>《耶穌我愛祢》</a:t>
             </a:r>
           </a:p>
         </p:txBody>

</xml_diff>